<commit_message>
Update graph of components
</commit_message>
<xml_diff>
--- a/PAGE Components.pptx
+++ b/PAGE Components.pptx
@@ -104,6 +104,22 @@
       </a:defRPr>
     </a:lvl9pPr>
   </p:defaultTextStyle>
+  <p:extLst>
+    <p:ext uri="{EFAFB233-063F-42B5-8137-9DF3F51BA10A}">
+      <p15:sldGuideLst xmlns:p15="http://schemas.microsoft.com/office/powerpoint/2012/main">
+        <p15:guide id="1" orient="horz" pos="4320">
+          <p15:clr>
+            <a:srgbClr val="A4A3A4"/>
+          </p15:clr>
+        </p15:guide>
+        <p15:guide id="2" pos="7488">
+          <p15:clr>
+            <a:srgbClr val="A4A3A4"/>
+          </p15:clr>
+        </p15:guide>
+      </p15:sldGuideLst>
+    </p:ext>
+  </p:extLst>
 </p:presentation>
 </file>
 
@@ -238,7 +254,7 @@
           <a:p>
             <a:fld id="{4F966ABF-DECE-4223-9985-F705B8EF8522}" type="datetimeFigureOut">
               <a:rPr lang="en-US" smtClean="0"/>
-              <a:t>6/28/16</a:t>
+              <a:t>9/19/2016</a:t>
             </a:fld>
             <a:endParaRPr lang="en-US"/>
           </a:p>
@@ -408,7 +424,7 @@
           <a:p>
             <a:fld id="{4F966ABF-DECE-4223-9985-F705B8EF8522}" type="datetimeFigureOut">
               <a:rPr lang="en-US" smtClean="0"/>
-              <a:t>6/28/16</a:t>
+              <a:t>9/19/2016</a:t>
             </a:fld>
             <a:endParaRPr lang="en-US"/>
           </a:p>
@@ -588,7 +604,7 @@
           <a:p>
             <a:fld id="{4F966ABF-DECE-4223-9985-F705B8EF8522}" type="datetimeFigureOut">
               <a:rPr lang="en-US" smtClean="0"/>
-              <a:t>6/28/16</a:t>
+              <a:t>9/19/2016</a:t>
             </a:fld>
             <a:endParaRPr lang="en-US"/>
           </a:p>
@@ -758,7 +774,7 @@
           <a:p>
             <a:fld id="{4F966ABF-DECE-4223-9985-F705B8EF8522}" type="datetimeFigureOut">
               <a:rPr lang="en-US" smtClean="0"/>
-              <a:t>6/28/16</a:t>
+              <a:t>9/19/2016</a:t>
             </a:fld>
             <a:endParaRPr lang="en-US"/>
           </a:p>
@@ -1004,7 +1020,7 @@
           <a:p>
             <a:fld id="{4F966ABF-DECE-4223-9985-F705B8EF8522}" type="datetimeFigureOut">
               <a:rPr lang="en-US" smtClean="0"/>
-              <a:t>6/28/16</a:t>
+              <a:t>9/19/2016</a:t>
             </a:fld>
             <a:endParaRPr lang="en-US"/>
           </a:p>
@@ -1236,7 +1252,7 @@
           <a:p>
             <a:fld id="{4F966ABF-DECE-4223-9985-F705B8EF8522}" type="datetimeFigureOut">
               <a:rPr lang="en-US" smtClean="0"/>
-              <a:t>6/28/16</a:t>
+              <a:t>9/19/2016</a:t>
             </a:fld>
             <a:endParaRPr lang="en-US"/>
           </a:p>
@@ -1603,7 +1619,7 @@
           <a:p>
             <a:fld id="{4F966ABF-DECE-4223-9985-F705B8EF8522}" type="datetimeFigureOut">
               <a:rPr lang="en-US" smtClean="0"/>
-              <a:t>6/28/16</a:t>
+              <a:t>9/19/2016</a:t>
             </a:fld>
             <a:endParaRPr lang="en-US"/>
           </a:p>
@@ -1721,7 +1737,7 @@
           <a:p>
             <a:fld id="{4F966ABF-DECE-4223-9985-F705B8EF8522}" type="datetimeFigureOut">
               <a:rPr lang="en-US" smtClean="0"/>
-              <a:t>6/28/16</a:t>
+              <a:t>9/19/2016</a:t>
             </a:fld>
             <a:endParaRPr lang="en-US"/>
           </a:p>
@@ -1816,7 +1832,7 @@
           <a:p>
             <a:fld id="{4F966ABF-DECE-4223-9985-F705B8EF8522}" type="datetimeFigureOut">
               <a:rPr lang="en-US" smtClean="0"/>
-              <a:t>6/28/16</a:t>
+              <a:t>9/19/2016</a:t>
             </a:fld>
             <a:endParaRPr lang="en-US"/>
           </a:p>
@@ -2093,7 +2109,7 @@
           <a:p>
             <a:fld id="{4F966ABF-DECE-4223-9985-F705B8EF8522}" type="datetimeFigureOut">
               <a:rPr lang="en-US" smtClean="0"/>
-              <a:t>6/28/16</a:t>
+              <a:t>9/19/2016</a:t>
             </a:fld>
             <a:endParaRPr lang="en-US"/>
           </a:p>
@@ -2350,7 +2366,7 @@
           <a:p>
             <a:fld id="{4F966ABF-DECE-4223-9985-F705B8EF8522}" type="datetimeFigureOut">
               <a:rPr lang="en-US" smtClean="0"/>
-              <a:t>6/28/16</a:t>
+              <a:t>9/19/2016</a:t>
             </a:fld>
             <a:endParaRPr lang="en-US"/>
           </a:p>
@@ -2563,7 +2579,7 @@
           <a:p>
             <a:fld id="{4F966ABF-DECE-4223-9985-F705B8EF8522}" type="datetimeFigureOut">
               <a:rPr lang="en-US" smtClean="0"/>
-              <a:t>6/28/16</a:t>
+              <a:t>9/19/2016</a:t>
             </a:fld>
             <a:endParaRPr lang="en-US"/>
           </a:p>
@@ -2982,7 +2998,9 @@
           <a:prstGeom prst="rect">
             <a:avLst/>
           </a:prstGeom>
-          <a:noFill/>
+          <a:solidFill>
+            <a:schemeClr val="accent6"/>
+          </a:solidFill>
           <a:ln w="19050">
             <a:solidFill>
               <a:srgbClr val="002060"/>
@@ -3034,7 +3052,9 @@
           <a:prstGeom prst="rect">
             <a:avLst/>
           </a:prstGeom>
-          <a:noFill/>
+          <a:solidFill>
+            <a:schemeClr val="accent6"/>
+          </a:solidFill>
           <a:ln w="19050">
             <a:solidFill>
               <a:srgbClr val="002060"/>
@@ -3253,7 +3273,9 @@
           <a:prstGeom prst="rect">
             <a:avLst/>
           </a:prstGeom>
-          <a:noFill/>
+          <a:solidFill>
+            <a:schemeClr val="accent6"/>
+          </a:solidFill>
           <a:ln w="19050">
             <a:solidFill>
               <a:srgbClr val="002060"/>
@@ -3355,7 +3377,9 @@
           <a:prstGeom prst="rect">
             <a:avLst/>
           </a:prstGeom>
-          <a:noFill/>
+          <a:solidFill>
+            <a:schemeClr val="accent6"/>
+          </a:solidFill>
           <a:ln w="19050">
             <a:solidFill>
               <a:srgbClr val="002060"/>
@@ -3502,7 +3526,9 @@
           <a:prstGeom prst="rect">
             <a:avLst/>
           </a:prstGeom>
-          <a:noFill/>
+          <a:solidFill>
+            <a:schemeClr val="accent6"/>
+          </a:solidFill>
           <a:ln w="19050">
             <a:solidFill>
               <a:srgbClr val="002060"/>
@@ -3592,9 +3618,10 @@
           <a:lstStyle/>
           <a:p>
             <a:r>
-              <a:rPr lang="en-US" sz="2000" dirty="0"/>
-              <a:t>Tolerability</a:t>
-            </a:r>
+              <a:rPr lang="en-US" sz="2000" dirty="0" smtClean="0"/>
+              <a:t>Tolerability NL</a:t>
+            </a:r>
+            <a:endParaRPr lang="en-US" sz="2000" dirty="0"/>
           </a:p>
           <a:p>
             <a:r>
@@ -3636,8 +3663,8 @@
           <a:lstStyle/>
           <a:p>
             <a:r>
-              <a:rPr lang="en-US" sz="2000" dirty="0"/>
-              <a:t>Discontinuity</a:t>
+              <a:rPr lang="en-US" sz="2000" dirty="0" smtClean="0"/>
+              <a:t>Discontinuity CS</a:t>
             </a:r>
             <a:endParaRPr lang="en-US" sz="2000" dirty="0">
               <a:solidFill>
@@ -3687,8 +3714,13 @@
           <a:p>
             <a:r>
               <a:rPr lang="en-US" sz="2000" dirty="0"/>
-              <a:t>Adaptation Costs</a:t>
-            </a:r>
+              <a:t>Adaptation </a:t>
+            </a:r>
+            <a:r>
+              <a:rPr lang="en-US" sz="2000" dirty="0" smtClean="0"/>
+              <a:t>Costs JR</a:t>
+            </a:r>
+            <a:endParaRPr lang="en-US" sz="2000" dirty="0"/>
           </a:p>
           <a:p>
             <a:r>
@@ -3712,6 +3744,52 @@
           <a:xfrm>
             <a:off x="16223628" y="1732400"/>
             <a:ext cx="2291787" cy="1015663"/>
+          </a:xfrm>
+          <a:prstGeom prst="rect">
+            <a:avLst/>
+          </a:prstGeom>
+          <a:solidFill>
+            <a:schemeClr val="accent6"/>
+          </a:solidFill>
+          <a:ln w="19050">
+            <a:solidFill>
+              <a:srgbClr val="002060"/>
+            </a:solidFill>
+          </a:ln>
+        </p:spPr>
+        <p:txBody>
+          <a:bodyPr wrap="square" rtlCol="0">
+            <a:spAutoFit/>
+          </a:bodyPr>
+          <a:lstStyle/>
+          <a:p>
+            <a:r>
+              <a:rPr lang="en-US" sz="2000" dirty="0"/>
+              <a:t>Sea Level Rise</a:t>
+            </a:r>
+          </a:p>
+          <a:p>
+            <a:r>
+              <a:rPr lang="en-US" sz="2000" dirty="0">
+                <a:solidFill>
+                  <a:srgbClr val="FF0000"/>
+                </a:solidFill>
+              </a:rPr>
+              <a:t>SLTEMP, ES, EXPFS, SLA, SLTAU</a:t>
+            </a:r>
+          </a:p>
+        </p:txBody>
+      </p:sp>
+      <p:sp>
+        <p:nvSpPr>
+          <p:cNvPr id="65" name="TextBox 64"/>
+          <p:cNvSpPr txBox="1"/>
+          <p:nvPr/>
+        </p:nvSpPr>
+        <p:spPr>
+          <a:xfrm>
+            <a:off x="16170945" y="667903"/>
+            <a:ext cx="2291787" cy="707886"/>
           </a:xfrm>
           <a:prstGeom prst="rect">
             <a:avLst/>
@@ -3730,9 +3808,10 @@
           <a:lstStyle/>
           <a:p>
             <a:r>
-              <a:rPr lang="en-US" sz="2000" dirty="0"/>
-              <a:t>Sea Level Rise</a:t>
-            </a:r>
+              <a:rPr lang="en-US" sz="2000" dirty="0" smtClean="0"/>
+              <a:t>GDP VV</a:t>
+            </a:r>
+            <a:endParaRPr lang="en-US" sz="2000" dirty="0"/>
           </a:p>
           <a:p>
             <a:r>
@@ -3741,20 +3820,20 @@
                   <a:srgbClr val="FF0000"/>
                 </a:solidFill>
               </a:rPr>
-              <a:t>SLTEMP, ES, EXPFS, SLA, SLTAU</a:t>
-            </a:r>
-          </a:p>
-        </p:txBody>
-      </p:sp>
-      <p:sp>
-        <p:nvSpPr>
-          <p:cNvPr id="65" name="TextBox 64"/>
+              <a:t>GDP, GRW</a:t>
+            </a:r>
+          </a:p>
+        </p:txBody>
+      </p:sp>
+      <p:sp>
+        <p:nvSpPr>
+          <p:cNvPr id="70" name="TextBox 69"/>
           <p:cNvSpPr txBox="1"/>
           <p:nvPr/>
         </p:nvSpPr>
         <p:spPr>
           <a:xfrm>
-            <a:off x="16170945" y="667903"/>
+            <a:off x="21331938" y="4069298"/>
             <a:ext cx="2291787" cy="707886"/>
           </a:xfrm>
           <a:prstGeom prst="rect">
@@ -3775,7 +3854,7 @@
           <a:p>
             <a:r>
               <a:rPr lang="en-US" sz="2000" dirty="0"/>
-              <a:t>GDP</a:t>
+              <a:t>Total Impacts</a:t>
             </a:r>
           </a:p>
           <a:p>
@@ -3785,21 +3864,21 @@
                   <a:srgbClr val="FF0000"/>
                 </a:solidFill>
               </a:rPr>
-              <a:t>GDP, GRW</a:t>
-            </a:r>
-          </a:p>
-        </p:txBody>
-      </p:sp>
-      <p:sp>
-        <p:nvSpPr>
-          <p:cNvPr id="70" name="TextBox 69"/>
+              <a:t>AD, DD, WIT</a:t>
+            </a:r>
+          </a:p>
+        </p:txBody>
+      </p:sp>
+      <p:sp>
+        <p:nvSpPr>
+          <p:cNvPr id="87" name="TextBox 86"/>
           <p:cNvSpPr txBox="1"/>
           <p:nvPr/>
         </p:nvSpPr>
         <p:spPr>
           <a:xfrm>
-            <a:off x="21331938" y="4069298"/>
-            <a:ext cx="2291787" cy="707886"/>
+            <a:off x="19879404" y="530739"/>
+            <a:ext cx="2291787" cy="1015663"/>
           </a:xfrm>
           <a:prstGeom prst="rect">
             <a:avLst/>
@@ -3819,7 +3898,7 @@
           <a:p>
             <a:r>
               <a:rPr lang="en-US" sz="2000" dirty="0"/>
-              <a:t>Total Impacts</a:t>
+              <a:t>Damages</a:t>
             </a:r>
           </a:p>
           <a:p>
@@ -3829,21 +3908,21 @@
                   <a:srgbClr val="FF0000"/>
                 </a:solidFill>
               </a:rPr>
-              <a:t>AD, DD, WIT</a:t>
-            </a:r>
-          </a:p>
-        </p:txBody>
-      </p:sp>
-      <p:sp>
-        <p:nvSpPr>
-          <p:cNvPr id="87" name="TextBox 86"/>
+              <a:t>W, WF, WDIS, WI, POW, IMP</a:t>
+            </a:r>
+          </a:p>
+        </p:txBody>
+      </p:sp>
+      <p:sp>
+        <p:nvSpPr>
+          <p:cNvPr id="96" name="TextBox 95"/>
           <p:cNvSpPr txBox="1"/>
           <p:nvPr/>
         </p:nvSpPr>
         <p:spPr>
           <a:xfrm>
-            <a:off x="19879404" y="530739"/>
-            <a:ext cx="2291787" cy="1015663"/>
+            <a:off x="19913757" y="8250809"/>
+            <a:ext cx="2564075" cy="1323439"/>
           </a:xfrm>
           <a:prstGeom prst="rect">
             <a:avLst/>
@@ -3863,51 +3942,11 @@
           <a:p>
             <a:r>
               <a:rPr lang="en-US" sz="2000" dirty="0"/>
-              <a:t>Damages</a:t>
-            </a:r>
-          </a:p>
-          <a:p>
-            <a:r>
-              <a:rPr lang="en-US" sz="2000" dirty="0">
-                <a:solidFill>
-                  <a:srgbClr val="FF0000"/>
-                </a:solidFill>
-              </a:rPr>
-              <a:t>W, WF, WDIS, WI, POW, IMP</a:t>
-            </a:r>
-          </a:p>
-        </p:txBody>
-      </p:sp>
-      <p:sp>
-        <p:nvSpPr>
-          <p:cNvPr id="96" name="TextBox 95"/>
-          <p:cNvSpPr txBox="1"/>
-          <p:nvPr/>
-        </p:nvSpPr>
-        <p:spPr>
-          <a:xfrm>
-            <a:off x="19913757" y="8250809"/>
-            <a:ext cx="2291787" cy="1323439"/>
-          </a:xfrm>
-          <a:prstGeom prst="rect">
-            <a:avLst/>
-          </a:prstGeom>
-          <a:noFill/>
-          <a:ln w="19050">
-            <a:solidFill>
-              <a:srgbClr val="002060"/>
-            </a:solidFill>
-          </a:ln>
-        </p:spPr>
-        <p:txBody>
-          <a:bodyPr wrap="square" rtlCol="0">
-            <a:spAutoFit/>
-          </a:bodyPr>
-          <a:lstStyle/>
-          <a:p>
-            <a:r>
-              <a:rPr lang="en-US" sz="2000" dirty="0"/>
-              <a:t>Preventative Costs</a:t>
+              <a:t>Preventative </a:t>
+            </a:r>
+            <a:r>
+              <a:rPr lang="en-US" sz="2000" dirty="0" smtClean="0"/>
+              <a:t>Costs FM</a:t>
             </a:r>
             <a:endParaRPr lang="en-US" sz="2000" dirty="0">
               <a:solidFill>
@@ -4543,8 +4582,8 @@
           </a:xfrm>
           <a:prstGeom prst="bentConnector4">
             <a:avLst>
-              <a:gd name="adj1" fmla="val 8983"/>
-              <a:gd name="adj2" fmla="val 172852"/>
+              <a:gd name="adj1" fmla="val 45508"/>
+              <a:gd name="adj2" fmla="val 120566"/>
             </a:avLst>
           </a:prstGeom>
           <a:ln>
@@ -4657,7 +4696,9 @@
           <a:prstGeom prst="rect">
             <a:avLst/>
           </a:prstGeom>
-          <a:noFill/>
+          <a:solidFill>
+            <a:schemeClr val="accent6"/>
+          </a:solidFill>
           <a:ln w="19050">
             <a:solidFill>
               <a:srgbClr val="002060"/>
@@ -4680,11 +4721,7 @@
             </a:r>
             <a:r>
               <a:rPr lang="en-US" sz="2000" dirty="0" smtClean="0"/>
-              <a:t> </a:t>
-            </a:r>
-            <a:r>
-              <a:rPr lang="en-US" sz="2000" dirty="0" smtClean="0"/>
-              <a:t>forcing</a:t>
+              <a:t> forcing</a:t>
             </a:r>
           </a:p>
           <a:p>
@@ -4756,7 +4793,9 @@
           <a:prstGeom prst="rect">
             <a:avLst/>
           </a:prstGeom>
-          <a:noFill/>
+          <a:solidFill>
+            <a:schemeClr val="accent6"/>
+          </a:solidFill>
           <a:ln w="19050">
             <a:solidFill>
               <a:srgbClr val="002060"/>
@@ -4783,11 +4822,7 @@
             </a:r>
             <a:r>
               <a:rPr lang="en-US" sz="2000" dirty="0" smtClean="0"/>
-              <a:t> </a:t>
-            </a:r>
-            <a:r>
-              <a:rPr lang="en-US" sz="2000" dirty="0" smtClean="0"/>
-              <a:t>forcing</a:t>
+              <a:t> forcing</a:t>
             </a:r>
           </a:p>
           <a:p>
@@ -5111,7 +5146,7 @@
   <a:extraClrSchemeLst/>
   <a:extLst>
     <a:ext uri="{05A4C25C-085E-4340-85A3-A5531E510DB2}">
-      <thm15:themeFamily xmlns="" xmlns:thm15="http://schemas.microsoft.com/office/thememl/2012/main" name="Office Theme" id="{62F939B6-93AF-4DB8-9C6B-D6C7DFDC589F}" vid="{4A3C46E8-61CC-4603-A589-7422A47A8E4A}"/>
+      <thm15:themeFamily xmlns:thm15="http://schemas.microsoft.com/office/thememl/2012/main" name="Office Theme" id="{62F939B6-93AF-4DB8-9C6B-D6C7DFDC589F}" vid="{4A3C46E8-61CC-4603-A589-7422A47A8E4A}"/>
     </a:ext>
   </a:extLst>
 </a:theme>

</xml_diff>